<commit_message>
Update file slide, thêm module log
</commit_message>
<xml_diff>
--- a/Slide.pptx
+++ b/Slide.pptx
@@ -5,7 +5,7 @@
     <p:sldMasterId id="2147483660" r:id="rId1"/>
   </p:sldMasterIdLst>
   <p:notesMasterIdLst>
-    <p:notesMasterId r:id="rId9"/>
+    <p:notesMasterId r:id="rId11"/>
   </p:notesMasterIdLst>
   <p:sldIdLst>
     <p:sldId id="256" r:id="rId2"/>
@@ -15,6 +15,8 @@
     <p:sldId id="260" r:id="rId6"/>
     <p:sldId id="261" r:id="rId7"/>
     <p:sldId id="262" r:id="rId8"/>
+    <p:sldId id="263" r:id="rId9"/>
+    <p:sldId id="264" r:id="rId10"/>
   </p:sldIdLst>
   <p:sldSz cx="12192000" cy="6858000"/>
   <p:notesSz cx="6858000" cy="9144000"/>
@@ -113,6 +115,11 @@
       </a:defRPr>
     </a:lvl9pPr>
   </p:defaultTextStyle>
+  <p:extLst>
+    <p:ext uri="{EFAFB233-063F-42B5-8137-9DF3F51BA10A}">
+      <p15:sldGuideLst xmlns:p15="http://schemas.microsoft.com/office/powerpoint/2012/main"/>
+    </p:ext>
+  </p:extLst>
 </p:presentation>
 </file>
 
@@ -6612,7 +6619,7 @@
         <p:spPr>
           <a:xfrm>
             <a:off x="1063869" y="1301261"/>
-            <a:ext cx="921086" cy="369332"/>
+            <a:ext cx="740908" cy="369332"/>
           </a:xfrm>
           <a:prstGeom prst="rect">
             <a:avLst/>
@@ -6626,23 +6633,22 @@
           <a:lstStyle/>
           <a:p>
             <a:r>
-              <a:rPr lang="en-US" dirty="0" smtClean="0"/>
-              <a:t>1. AOP?</a:t>
-            </a:r>
-            <a:endParaRPr lang="en-US" dirty="0"/>
-          </a:p>
-        </p:txBody>
-      </p:sp>
-      <p:sp>
-        <p:nvSpPr>
-          <p:cNvPr id="6" name="TextBox 5"/>
+              <a:rPr lang="en-US" smtClean="0"/>
+              <a:t>3. Log</a:t>
+            </a:r>
+          </a:p>
+        </p:txBody>
+      </p:sp>
+      <p:sp>
+        <p:nvSpPr>
+          <p:cNvPr id="8" name="TextBox 7"/>
           <p:cNvSpPr txBox="1"/>
           <p:nvPr/>
         </p:nvSpPr>
         <p:spPr>
           <a:xfrm>
-            <a:off x="1063869" y="3191532"/>
-            <a:ext cx="820096" cy="369332"/>
+            <a:off x="1553143" y="1705707"/>
+            <a:ext cx="2707601" cy="369332"/>
           </a:xfrm>
           <a:prstGeom prst="rect">
             <a:avLst/>
@@ -6656,461 +6662,8 @@
           <a:lstStyle/>
           <a:p>
             <a:r>
-              <a:rPr lang="en-US" dirty="0" smtClean="0"/>
-              <a:t>2. AOR</a:t>
-            </a:r>
-            <a:endParaRPr lang="en-US" dirty="0"/>
-          </a:p>
-        </p:txBody>
-      </p:sp>
-      <p:sp>
-        <p:nvSpPr>
-          <p:cNvPr id="7" name="TextBox 6"/>
-          <p:cNvSpPr txBox="1"/>
-          <p:nvPr/>
-        </p:nvSpPr>
-        <p:spPr>
-          <a:xfrm>
-            <a:off x="1063869" y="4646250"/>
-            <a:ext cx="740908" cy="369332"/>
-          </a:xfrm>
-          <a:prstGeom prst="rect">
-            <a:avLst/>
-          </a:prstGeom>
-          <a:noFill/>
-        </p:spPr>
-        <p:txBody>
-          <a:bodyPr wrap="none" rtlCol="0">
-            <a:spAutoFit/>
-          </a:bodyPr>
-          <a:lstStyle/>
-          <a:p>
-            <a:r>
-              <a:rPr lang="en-US" dirty="0" smtClean="0"/>
-              <a:t>3. Log</a:t>
-            </a:r>
-            <a:endParaRPr lang="en-US" dirty="0"/>
-          </a:p>
-        </p:txBody>
-      </p:sp>
-      <p:sp>
-        <p:nvSpPr>
-          <p:cNvPr id="8" name="TextBox 7"/>
-          <p:cNvSpPr txBox="1"/>
-          <p:nvPr/>
-        </p:nvSpPr>
-        <p:spPr>
-          <a:xfrm>
-            <a:off x="1553143" y="1705707"/>
-            <a:ext cx="1469313" cy="369332"/>
-          </a:xfrm>
-          <a:prstGeom prst="rect">
-            <a:avLst/>
-          </a:prstGeom>
-          <a:noFill/>
-        </p:spPr>
-        <p:txBody>
-          <a:bodyPr wrap="none" rtlCol="0">
-            <a:spAutoFit/>
-          </a:bodyPr>
-          <a:lstStyle/>
-          <a:p>
-            <a:r>
-              <a:rPr lang="en-US" dirty="0" smtClean="0"/>
-              <a:t>1.1 AOP </a:t>
-            </a:r>
-            <a:r>
-              <a:rPr lang="en-US" dirty="0" err="1" smtClean="0"/>
-              <a:t>là</a:t>
-            </a:r>
-            <a:r>
-              <a:rPr lang="en-US" dirty="0" smtClean="0"/>
-              <a:t> </a:t>
-            </a:r>
-            <a:r>
-              <a:rPr lang="en-US" dirty="0" err="1" smtClean="0"/>
-              <a:t>gì</a:t>
-            </a:r>
-            <a:r>
-              <a:rPr lang="en-US" dirty="0" smtClean="0"/>
-              <a:t>?</a:t>
-            </a:r>
-          </a:p>
-        </p:txBody>
-      </p:sp>
-      <p:sp>
-        <p:nvSpPr>
-          <p:cNvPr id="9" name="TextBox 8"/>
-          <p:cNvSpPr txBox="1"/>
-          <p:nvPr/>
-        </p:nvSpPr>
-        <p:spPr>
-          <a:xfrm>
-            <a:off x="1553143" y="2145322"/>
-            <a:ext cx="2629246" cy="369332"/>
-          </a:xfrm>
-          <a:prstGeom prst="rect">
-            <a:avLst/>
-          </a:prstGeom>
-          <a:noFill/>
-        </p:spPr>
-        <p:txBody>
-          <a:bodyPr wrap="none" rtlCol="0">
-            <a:spAutoFit/>
-          </a:bodyPr>
-          <a:lstStyle/>
-          <a:p>
-            <a:r>
-              <a:rPr lang="en-US" dirty="0" smtClean="0"/>
-              <a:t>1.2 </a:t>
-            </a:r>
-            <a:r>
-              <a:rPr lang="en-US" dirty="0" err="1" smtClean="0"/>
-              <a:t>Áp</a:t>
-            </a:r>
-            <a:r>
-              <a:rPr lang="en-US" dirty="0" smtClean="0"/>
-              <a:t> </a:t>
-            </a:r>
-            <a:r>
-              <a:rPr lang="en-US" dirty="0" err="1" smtClean="0"/>
-              <a:t>dụng</a:t>
-            </a:r>
-            <a:r>
-              <a:rPr lang="en-US" dirty="0" smtClean="0"/>
-              <a:t> </a:t>
-            </a:r>
-            <a:r>
-              <a:rPr lang="en-US" dirty="0" err="1" smtClean="0"/>
-              <a:t>như</a:t>
-            </a:r>
-            <a:r>
-              <a:rPr lang="en-US" dirty="0" smtClean="0"/>
-              <a:t> </a:t>
-            </a:r>
-            <a:r>
-              <a:rPr lang="en-US" dirty="0" err="1" smtClean="0"/>
-              <a:t>thế</a:t>
-            </a:r>
-            <a:r>
-              <a:rPr lang="en-US" dirty="0" smtClean="0"/>
-              <a:t> </a:t>
-            </a:r>
-            <a:r>
-              <a:rPr lang="en-US" dirty="0" err="1" smtClean="0"/>
-              <a:t>nào</a:t>
-            </a:r>
-            <a:r>
-              <a:rPr lang="en-US" dirty="0" smtClean="0"/>
-              <a:t>?</a:t>
-            </a:r>
-          </a:p>
-        </p:txBody>
-      </p:sp>
-      <p:sp>
-        <p:nvSpPr>
-          <p:cNvPr id="10" name="TextBox 9"/>
-          <p:cNvSpPr txBox="1"/>
-          <p:nvPr/>
-        </p:nvSpPr>
-        <p:spPr>
-          <a:xfrm>
-            <a:off x="1553143" y="2659634"/>
-            <a:ext cx="1341521" cy="369332"/>
-          </a:xfrm>
-          <a:prstGeom prst="rect">
-            <a:avLst/>
-          </a:prstGeom>
-          <a:noFill/>
-        </p:spPr>
-        <p:txBody>
-          <a:bodyPr wrap="none" rtlCol="0">
-            <a:spAutoFit/>
-          </a:bodyPr>
-          <a:lstStyle/>
-          <a:p>
-            <a:r>
-              <a:rPr lang="en-US" dirty="0" smtClean="0"/>
-              <a:t>1.3 </a:t>
-            </a:r>
-            <a:r>
-              <a:rPr lang="en-US" dirty="0" err="1" smtClean="0"/>
-              <a:t>Mở</a:t>
-            </a:r>
-            <a:r>
-              <a:rPr lang="en-US" dirty="0" smtClean="0"/>
-              <a:t> </a:t>
-            </a:r>
-            <a:r>
-              <a:rPr lang="en-US" dirty="0" err="1" smtClean="0"/>
-              <a:t>rộng</a:t>
-            </a:r>
-            <a:endParaRPr lang="en-US" dirty="0" smtClean="0"/>
-          </a:p>
-        </p:txBody>
-      </p:sp>
-      <p:sp>
-        <p:nvSpPr>
-          <p:cNvPr id="11" name="TextBox 10"/>
-          <p:cNvSpPr txBox="1"/>
-          <p:nvPr/>
-        </p:nvSpPr>
-        <p:spPr>
-          <a:xfrm>
-            <a:off x="1553143" y="3666261"/>
-            <a:ext cx="1469313" cy="369332"/>
-          </a:xfrm>
-          <a:prstGeom prst="rect">
-            <a:avLst/>
-          </a:prstGeom>
-          <a:noFill/>
-        </p:spPr>
-        <p:txBody>
-          <a:bodyPr wrap="none" rtlCol="0">
-            <a:spAutoFit/>
-          </a:bodyPr>
-          <a:lstStyle/>
-          <a:p>
-            <a:r>
-              <a:rPr lang="en-US" dirty="0"/>
-              <a:t>2</a:t>
-            </a:r>
-            <a:r>
-              <a:rPr lang="en-US" dirty="0" smtClean="0"/>
-              <a:t>.1 AOR </a:t>
-            </a:r>
-            <a:r>
-              <a:rPr lang="en-US" dirty="0" err="1" smtClean="0"/>
-              <a:t>là</a:t>
-            </a:r>
-            <a:r>
-              <a:rPr lang="en-US" dirty="0" smtClean="0"/>
-              <a:t> </a:t>
-            </a:r>
-            <a:r>
-              <a:rPr lang="en-US" dirty="0" err="1" smtClean="0"/>
-              <a:t>gì</a:t>
-            </a:r>
-            <a:r>
-              <a:rPr lang="en-US" dirty="0" smtClean="0"/>
-              <a:t>?</a:t>
-            </a:r>
-          </a:p>
-        </p:txBody>
-      </p:sp>
-      <p:sp>
-        <p:nvSpPr>
-          <p:cNvPr id="12" name="TextBox 11"/>
-          <p:cNvSpPr txBox="1"/>
-          <p:nvPr/>
-        </p:nvSpPr>
-        <p:spPr>
-          <a:xfrm>
-            <a:off x="1553143" y="4105876"/>
-            <a:ext cx="2629246" cy="369332"/>
-          </a:xfrm>
-          <a:prstGeom prst="rect">
-            <a:avLst/>
-          </a:prstGeom>
-          <a:noFill/>
-        </p:spPr>
-        <p:txBody>
-          <a:bodyPr wrap="none" rtlCol="0">
-            <a:spAutoFit/>
-          </a:bodyPr>
-          <a:lstStyle/>
-          <a:p>
-            <a:r>
-              <a:rPr lang="en-US" dirty="0"/>
-              <a:t>2</a:t>
-            </a:r>
-            <a:r>
-              <a:rPr lang="en-US" dirty="0" smtClean="0"/>
-              <a:t>.2 </a:t>
-            </a:r>
-            <a:r>
-              <a:rPr lang="en-US" dirty="0" err="1" smtClean="0"/>
-              <a:t>Áp</a:t>
-            </a:r>
-            <a:r>
-              <a:rPr lang="en-US" dirty="0" smtClean="0"/>
-              <a:t> </a:t>
-            </a:r>
-            <a:r>
-              <a:rPr lang="en-US" dirty="0" err="1" smtClean="0"/>
-              <a:t>dụng</a:t>
-            </a:r>
-            <a:r>
-              <a:rPr lang="en-US" dirty="0" smtClean="0"/>
-              <a:t> </a:t>
-            </a:r>
-            <a:r>
-              <a:rPr lang="en-US" dirty="0" err="1" smtClean="0"/>
-              <a:t>như</a:t>
-            </a:r>
-            <a:r>
-              <a:rPr lang="en-US" dirty="0" smtClean="0"/>
-              <a:t> </a:t>
-            </a:r>
-            <a:r>
-              <a:rPr lang="en-US" dirty="0" err="1" smtClean="0"/>
-              <a:t>thế</a:t>
-            </a:r>
-            <a:r>
-              <a:rPr lang="en-US" dirty="0" smtClean="0"/>
-              <a:t> </a:t>
-            </a:r>
-            <a:r>
-              <a:rPr lang="en-US" dirty="0" err="1" smtClean="0"/>
-              <a:t>nào</a:t>
-            </a:r>
-            <a:r>
-              <a:rPr lang="en-US" dirty="0" smtClean="0"/>
-              <a:t>?</a:t>
-            </a:r>
-          </a:p>
-        </p:txBody>
-      </p:sp>
-      <p:sp>
-        <p:nvSpPr>
-          <p:cNvPr id="14" name="TextBox 13"/>
-          <p:cNvSpPr txBox="1"/>
-          <p:nvPr/>
-        </p:nvSpPr>
-        <p:spPr>
-          <a:xfrm>
-            <a:off x="1553143" y="5120979"/>
-            <a:ext cx="2707601" cy="369332"/>
-          </a:xfrm>
-          <a:prstGeom prst="rect">
-            <a:avLst/>
-          </a:prstGeom>
-          <a:noFill/>
-        </p:spPr>
-        <p:txBody>
-          <a:bodyPr wrap="none" rtlCol="0">
-            <a:spAutoFit/>
-          </a:bodyPr>
-          <a:lstStyle/>
-          <a:p>
-            <a:r>
-              <a:rPr lang="en-US" dirty="0" smtClean="0"/>
-              <a:t>3.1 </a:t>
-            </a:r>
-            <a:r>
-              <a:rPr lang="en-US" dirty="0" err="1" smtClean="0"/>
-              <a:t>Tại</a:t>
-            </a:r>
-            <a:r>
-              <a:rPr lang="en-US" dirty="0" smtClean="0"/>
-              <a:t> </a:t>
-            </a:r>
-            <a:r>
-              <a:rPr lang="en-US" dirty="0" err="1" smtClean="0"/>
-              <a:t>sao</a:t>
-            </a:r>
-            <a:r>
-              <a:rPr lang="en-US" dirty="0" smtClean="0"/>
-              <a:t> </a:t>
-            </a:r>
-            <a:r>
-              <a:rPr lang="en-US" dirty="0" err="1" smtClean="0"/>
-              <a:t>là</a:t>
-            </a:r>
-            <a:r>
-              <a:rPr lang="en-US" dirty="0" smtClean="0"/>
-              <a:t> </a:t>
-            </a:r>
-            <a:r>
-              <a:rPr lang="en-US" dirty="0" err="1" smtClean="0"/>
-              <a:t>Nlog</a:t>
-            </a:r>
-            <a:r>
-              <a:rPr lang="en-US" dirty="0" smtClean="0"/>
-              <a:t>/</a:t>
-            </a:r>
-            <a:r>
-              <a:rPr lang="en-US" dirty="0" err="1" smtClean="0"/>
-              <a:t>Serilog</a:t>
-            </a:r>
-            <a:r>
-              <a:rPr lang="en-US" dirty="0" smtClean="0"/>
-              <a:t>?</a:t>
-            </a:r>
-          </a:p>
-        </p:txBody>
-      </p:sp>
-      <p:sp>
-        <p:nvSpPr>
-          <p:cNvPr id="15" name="TextBox 14"/>
-          <p:cNvSpPr txBox="1"/>
-          <p:nvPr/>
-        </p:nvSpPr>
-        <p:spPr>
-          <a:xfrm>
-            <a:off x="1553143" y="5560594"/>
-            <a:ext cx="1181221" cy="369332"/>
-          </a:xfrm>
-          <a:prstGeom prst="rect">
-            <a:avLst/>
-          </a:prstGeom>
-          <a:noFill/>
-        </p:spPr>
-        <p:txBody>
-          <a:bodyPr wrap="none" rtlCol="0">
-            <a:spAutoFit/>
-          </a:bodyPr>
-          <a:lstStyle/>
-          <a:p>
-            <a:r>
-              <a:rPr lang="en-US" dirty="0" smtClean="0"/>
-              <a:t>3.2 </a:t>
-            </a:r>
-            <a:r>
-              <a:rPr lang="en-US" dirty="0" err="1" smtClean="0"/>
-              <a:t>Cài</a:t>
-            </a:r>
-            <a:r>
-              <a:rPr lang="en-US" dirty="0" smtClean="0"/>
-              <a:t> </a:t>
-            </a:r>
-            <a:r>
-              <a:rPr lang="en-US" dirty="0" err="1" smtClean="0"/>
-              <a:t>đặt</a:t>
-            </a:r>
-            <a:endParaRPr lang="en-US" dirty="0" smtClean="0"/>
-          </a:p>
-        </p:txBody>
-      </p:sp>
-      <p:sp>
-        <p:nvSpPr>
-          <p:cNvPr id="16" name="TextBox 15"/>
-          <p:cNvSpPr txBox="1"/>
-          <p:nvPr/>
-        </p:nvSpPr>
-        <p:spPr>
-          <a:xfrm>
-            <a:off x="1553143" y="6000209"/>
-            <a:ext cx="1340432" cy="369332"/>
-          </a:xfrm>
-          <a:prstGeom prst="rect">
-            <a:avLst/>
-          </a:prstGeom>
-          <a:noFill/>
-        </p:spPr>
-        <p:txBody>
-          <a:bodyPr wrap="none" rtlCol="0">
-            <a:spAutoFit/>
-          </a:bodyPr>
-          <a:lstStyle/>
-          <a:p>
-            <a:r>
-              <a:rPr lang="en-US" dirty="0" smtClean="0"/>
-              <a:t>3.3 </a:t>
-            </a:r>
-            <a:r>
-              <a:rPr lang="en-US" dirty="0" err="1" smtClean="0"/>
-              <a:t>Moduler</a:t>
+              <a:rPr lang="en-US" smtClean="0"/>
+              <a:t>3.1 Tại sao là Nlog/Serilog?</a:t>
             </a:r>
             <a:endParaRPr lang="en-US" dirty="0" smtClean="0"/>
           </a:p>
@@ -7215,6 +6768,150 @@
           </a:p>
         </p:txBody>
       </p:sp>
+      <p:sp>
+        <p:nvSpPr>
+          <p:cNvPr id="18" name="TextBox 17"/>
+          <p:cNvSpPr txBox="1"/>
+          <p:nvPr/>
+        </p:nvSpPr>
+        <p:spPr>
+          <a:xfrm>
+            <a:off x="1984955" y="2248258"/>
+            <a:ext cx="2998065" cy="369332"/>
+          </a:xfrm>
+          <a:prstGeom prst="rect">
+            <a:avLst/>
+          </a:prstGeom>
+          <a:noFill/>
+        </p:spPr>
+        <p:txBody>
+          <a:bodyPr wrap="none" rtlCol="0">
+            <a:spAutoFit/>
+          </a:bodyPr>
+          <a:lstStyle/>
+          <a:p>
+            <a:r>
+              <a:rPr lang="en-US" smtClean="0"/>
+              <a:t>- Config dễ hơn so với log4net</a:t>
+            </a:r>
+            <a:endParaRPr lang="en-US" dirty="0" smtClean="0"/>
+          </a:p>
+        </p:txBody>
+      </p:sp>
+      <p:sp>
+        <p:nvSpPr>
+          <p:cNvPr id="21" name="TextBox 20"/>
+          <p:cNvSpPr txBox="1"/>
+          <p:nvPr/>
+        </p:nvSpPr>
+        <p:spPr>
+          <a:xfrm>
+            <a:off x="1984955" y="2701105"/>
+            <a:ext cx="6436570" cy="369332"/>
+          </a:xfrm>
+          <a:prstGeom prst="rect">
+            <a:avLst/>
+          </a:prstGeom>
+          <a:noFill/>
+        </p:spPr>
+        <p:txBody>
+          <a:bodyPr wrap="none" rtlCol="0">
+            <a:spAutoFit/>
+          </a:bodyPr>
+          <a:lstStyle/>
+          <a:p>
+            <a:r>
+              <a:rPr lang="en-US" smtClean="0"/>
+              <a:t>- Hỗ trợ ghi log ra nhiều target: console, file, email, elasticsearch,…</a:t>
+            </a:r>
+            <a:endParaRPr lang="en-US" dirty="0" smtClean="0"/>
+          </a:p>
+        </p:txBody>
+      </p:sp>
+      <p:sp>
+        <p:nvSpPr>
+          <p:cNvPr id="22" name="TextBox 21"/>
+          <p:cNvSpPr txBox="1"/>
+          <p:nvPr/>
+        </p:nvSpPr>
+        <p:spPr>
+          <a:xfrm>
+            <a:off x="1984955" y="3184724"/>
+            <a:ext cx="6948762" cy="646331"/>
+          </a:xfrm>
+          <a:prstGeom prst="rect">
+            <a:avLst/>
+          </a:prstGeom>
+          <a:noFill/>
+        </p:spPr>
+        <p:txBody>
+          <a:bodyPr wrap="none" rtlCol="0">
+            <a:spAutoFit/>
+          </a:bodyPr>
+          <a:lstStyle/>
+          <a:p>
+            <a:r>
+              <a:rPr lang="en-US" smtClean="0"/>
+              <a:t>- Ưu khuyết điểm: Nlog hỗ trợ .net 3.5, phù hợp với các dự án cũ. Đối với</a:t>
+            </a:r>
+          </a:p>
+          <a:p>
+            <a:r>
+              <a:rPr lang="en-US" smtClean="0"/>
+              <a:t>các dự án mới nên sử dụng serilog (hỗ trợ ghi file log có cấu trúc)</a:t>
+            </a:r>
+            <a:endParaRPr lang="en-US" dirty="0" smtClean="0"/>
+          </a:p>
+        </p:txBody>
+      </p:sp>
+      <p:pic>
+        <p:nvPicPr>
+          <p:cNvPr id="2" name="Picture 1"/>
+          <p:cNvPicPr>
+            <a:picLocks noChangeAspect="1"/>
+          </p:cNvPicPr>
+          <p:nvPr/>
+        </p:nvPicPr>
+        <p:blipFill>
+          <a:blip r:embed="rId2"/>
+          <a:stretch>
+            <a:fillRect/>
+          </a:stretch>
+        </p:blipFill>
+        <p:spPr>
+          <a:xfrm>
+            <a:off x="1535902" y="4065131"/>
+            <a:ext cx="9088555" cy="1028571"/>
+          </a:xfrm>
+          <a:prstGeom prst="rect">
+            <a:avLst/>
+          </a:prstGeom>
+        </p:spPr>
+      </p:pic>
+      <p:pic>
+        <p:nvPicPr>
+          <p:cNvPr id="3" name="Picture 2"/>
+          <p:cNvPicPr>
+            <a:picLocks noChangeAspect="1"/>
+          </p:cNvPicPr>
+          <p:nvPr/>
+        </p:nvPicPr>
+        <p:blipFill>
+          <a:blip r:embed="rId3"/>
+          <a:stretch>
+            <a:fillRect/>
+          </a:stretch>
+        </p:blipFill>
+        <p:spPr>
+          <a:xfrm>
+            <a:off x="2136573" y="5241165"/>
+            <a:ext cx="6133333" cy="447619"/>
+          </a:xfrm>
+          <a:prstGeom prst="rect">
+            <a:avLst/>
+          </a:prstGeom>
+        </p:spPr>
+      </p:pic>
     </p:spTree>
     <p:extLst>
       <p:ext uri="{BB962C8B-B14F-4D97-AF65-F5344CB8AC3E}">
@@ -7231,6 +6928,675 @@
         <p:cTn id="1" dur="indefinite" restart="never" nodeType="tmRoot"/>
       </p:par>
     </p:tnLst>
+  </p:timing>
+</p:sld>
+</file>
+
+<file path=ppt/slides/slide8.xml><?xml version="1.0" encoding="utf-8"?>
+<p:sld xmlns:a="http://schemas.openxmlformats.org/drawingml/2006/main" xmlns:r="http://schemas.openxmlformats.org/officeDocument/2006/relationships" xmlns:p="http://schemas.openxmlformats.org/presentationml/2006/main">
+  <p:cSld>
+    <p:spTree>
+      <p:nvGrpSpPr>
+        <p:cNvPr id="1" name=""/>
+        <p:cNvGrpSpPr/>
+        <p:nvPr/>
+      </p:nvGrpSpPr>
+      <p:grpSpPr>
+        <a:xfrm>
+          <a:off x="0" y="0"/>
+          <a:ext cx="0" cy="0"/>
+          <a:chOff x="0" y="0"/>
+          <a:chExt cx="0" cy="0"/>
+        </a:xfrm>
+      </p:grpSpPr>
+      <p:sp>
+        <p:nvSpPr>
+          <p:cNvPr id="4" name="TextBox 3"/>
+          <p:cNvSpPr txBox="1"/>
+          <p:nvPr/>
+        </p:nvSpPr>
+        <p:spPr>
+          <a:xfrm>
+            <a:off x="3147647" y="167055"/>
+            <a:ext cx="6119368" cy="861774"/>
+          </a:xfrm>
+          <a:prstGeom prst="rect">
+            <a:avLst/>
+          </a:prstGeom>
+          <a:noFill/>
+        </p:spPr>
+        <p:txBody>
+          <a:bodyPr wrap="none" rtlCol="0">
+            <a:spAutoFit/>
+          </a:bodyPr>
+          <a:lstStyle/>
+          <a:p>
+            <a:r>
+              <a:rPr lang="en-US" sz="5000" dirty="0" smtClean="0"/>
+              <a:t>Training AOP-AOR-LOG</a:t>
+            </a:r>
+            <a:endParaRPr lang="en-US" sz="5000" dirty="0"/>
+          </a:p>
+        </p:txBody>
+      </p:sp>
+      <p:sp>
+        <p:nvSpPr>
+          <p:cNvPr id="5" name="TextBox 4"/>
+          <p:cNvSpPr txBox="1"/>
+          <p:nvPr/>
+        </p:nvSpPr>
+        <p:spPr>
+          <a:xfrm>
+            <a:off x="1063869" y="1301261"/>
+            <a:ext cx="740908" cy="369332"/>
+          </a:xfrm>
+          <a:prstGeom prst="rect">
+            <a:avLst/>
+          </a:prstGeom>
+          <a:noFill/>
+        </p:spPr>
+        <p:txBody>
+          <a:bodyPr wrap="none" rtlCol="0">
+            <a:spAutoFit/>
+          </a:bodyPr>
+          <a:lstStyle/>
+          <a:p>
+            <a:r>
+              <a:rPr lang="en-US" smtClean="0"/>
+              <a:t>3. Log</a:t>
+            </a:r>
+          </a:p>
+        </p:txBody>
+      </p:sp>
+      <p:sp>
+        <p:nvSpPr>
+          <p:cNvPr id="8" name="TextBox 7"/>
+          <p:cNvSpPr txBox="1"/>
+          <p:nvPr/>
+        </p:nvSpPr>
+        <p:spPr>
+          <a:xfrm>
+            <a:off x="1553143" y="1705707"/>
+            <a:ext cx="1181221" cy="369332"/>
+          </a:xfrm>
+          <a:prstGeom prst="rect">
+            <a:avLst/>
+          </a:prstGeom>
+          <a:noFill/>
+        </p:spPr>
+        <p:txBody>
+          <a:bodyPr wrap="none" rtlCol="0">
+            <a:spAutoFit/>
+          </a:bodyPr>
+          <a:lstStyle/>
+          <a:p>
+            <a:r>
+              <a:rPr lang="en-US" smtClean="0"/>
+              <a:t>3.2 Cài đặt</a:t>
+            </a:r>
+            <a:endParaRPr lang="en-US" dirty="0" smtClean="0"/>
+          </a:p>
+        </p:txBody>
+      </p:sp>
+      <p:sp>
+        <p:nvSpPr>
+          <p:cNvPr id="17" name="TextBox 16"/>
+          <p:cNvSpPr txBox="1"/>
+          <p:nvPr/>
+        </p:nvSpPr>
+        <p:spPr>
+          <a:xfrm>
+            <a:off x="8806472" y="5622084"/>
+            <a:ext cx="1480213" cy="369332"/>
+          </a:xfrm>
+          <a:prstGeom prst="rect">
+            <a:avLst/>
+          </a:prstGeom>
+          <a:noFill/>
+        </p:spPr>
+        <p:txBody>
+          <a:bodyPr wrap="none" rtlCol="0">
+            <a:spAutoFit/>
+          </a:bodyPr>
+          <a:lstStyle/>
+          <a:p>
+            <a:r>
+              <a:rPr lang="en-US" dirty="0" smtClean="0"/>
+              <a:t>Đoàn Tô Châu</a:t>
+            </a:r>
+            <a:endParaRPr lang="en-US" dirty="0"/>
+          </a:p>
+        </p:txBody>
+      </p:sp>
+      <p:sp>
+        <p:nvSpPr>
+          <p:cNvPr id="19" name="TextBox 18"/>
+          <p:cNvSpPr txBox="1"/>
+          <p:nvPr/>
+        </p:nvSpPr>
+        <p:spPr>
+          <a:xfrm>
+            <a:off x="8806472" y="6079284"/>
+            <a:ext cx="1379480" cy="369332"/>
+          </a:xfrm>
+          <a:prstGeom prst="rect">
+            <a:avLst/>
+          </a:prstGeom>
+          <a:noFill/>
+        </p:spPr>
+        <p:txBody>
+          <a:bodyPr wrap="none" rtlCol="0">
+            <a:spAutoFit/>
+          </a:bodyPr>
+          <a:lstStyle/>
+          <a:p>
+            <a:r>
+              <a:rPr lang="en-US" dirty="0" err="1" smtClean="0"/>
+              <a:t>Trần</a:t>
+            </a:r>
+            <a:r>
+              <a:rPr lang="en-US" dirty="0" smtClean="0"/>
+              <a:t> </a:t>
+            </a:r>
+            <a:r>
+              <a:rPr lang="en-US" dirty="0" err="1" smtClean="0"/>
+              <a:t>Đại</a:t>
+            </a:r>
+            <a:r>
+              <a:rPr lang="en-US" dirty="0" smtClean="0"/>
+              <a:t> </a:t>
+            </a:r>
+            <a:r>
+              <a:rPr lang="en-US" dirty="0" err="1" smtClean="0"/>
+              <a:t>Việt</a:t>
+            </a:r>
+            <a:endParaRPr lang="en-US" dirty="0"/>
+          </a:p>
+        </p:txBody>
+      </p:sp>
+      <p:sp>
+        <p:nvSpPr>
+          <p:cNvPr id="20" name="Slide Number Placeholder 19"/>
+          <p:cNvSpPr>
+            <a:spLocks noGrp="1"/>
+          </p:cNvSpPr>
+          <p:nvPr>
+            <p:ph type="sldNum" sz="quarter" idx="12"/>
+          </p:nvPr>
+        </p:nvSpPr>
+        <p:spPr/>
+        <p:txBody>
+          <a:bodyPr/>
+          <a:lstStyle/>
+          <a:p>
+            <a:fld id="{220ACD78-42D4-4F83-B1EA-CB66A4DB74A6}" type="slidenum">
+              <a:rPr lang="en-US" smtClean="0"/>
+              <a:t>8</a:t>
+            </a:fld>
+            <a:endParaRPr lang="en-US"/>
+          </a:p>
+        </p:txBody>
+      </p:sp>
+      <p:sp>
+        <p:nvSpPr>
+          <p:cNvPr id="18" name="TextBox 17"/>
+          <p:cNvSpPr txBox="1"/>
+          <p:nvPr/>
+        </p:nvSpPr>
+        <p:spPr>
+          <a:xfrm>
+            <a:off x="1984955" y="2248258"/>
+            <a:ext cx="2818336" cy="369332"/>
+          </a:xfrm>
+          <a:prstGeom prst="rect">
+            <a:avLst/>
+          </a:prstGeom>
+          <a:noFill/>
+        </p:spPr>
+        <p:txBody>
+          <a:bodyPr wrap="none" rtlCol="0">
+            <a:spAutoFit/>
+          </a:bodyPr>
+          <a:lstStyle/>
+          <a:p>
+            <a:r>
+              <a:rPr lang="en-US" smtClean="0"/>
+              <a:t>- NLog: install-package NLog</a:t>
+            </a:r>
+            <a:endParaRPr lang="en-US" dirty="0" smtClean="0"/>
+          </a:p>
+        </p:txBody>
+      </p:sp>
+      <p:sp>
+        <p:nvSpPr>
+          <p:cNvPr id="21" name="TextBox 20"/>
+          <p:cNvSpPr txBox="1"/>
+          <p:nvPr/>
+        </p:nvSpPr>
+        <p:spPr>
+          <a:xfrm>
+            <a:off x="1989704" y="2683196"/>
+            <a:ext cx="3138936" cy="369332"/>
+          </a:xfrm>
+          <a:prstGeom prst="rect">
+            <a:avLst/>
+          </a:prstGeom>
+          <a:noFill/>
+        </p:spPr>
+        <p:txBody>
+          <a:bodyPr wrap="none" rtlCol="0">
+            <a:spAutoFit/>
+          </a:bodyPr>
+          <a:lstStyle/>
+          <a:p>
+            <a:r>
+              <a:rPr lang="en-US" smtClean="0"/>
+              <a:t>- Serilog: install-package Serilog</a:t>
+            </a:r>
+            <a:endParaRPr lang="en-US" dirty="0" smtClean="0"/>
+          </a:p>
+        </p:txBody>
+      </p:sp>
+    </p:spTree>
+    <p:extLst>
+      <p:ext uri="{BB962C8B-B14F-4D97-AF65-F5344CB8AC3E}">
+        <p14:creationId xmlns:p14="http://schemas.microsoft.com/office/powerpoint/2010/main" val="3843568491"/>
+      </p:ext>
+    </p:extLst>
+  </p:cSld>
+  <p:clrMapOvr>
+    <a:masterClrMapping/>
+  </p:clrMapOvr>
+  <p:timing>
+    <p:tnLst>
+      <p:par>
+        <p:cTn id="1" dur="indefinite" restart="never" nodeType="tmRoot"/>
+      </p:par>
+    </p:tnLst>
+  </p:timing>
+</p:sld>
+</file>
+
+<file path=ppt/slides/slide9.xml><?xml version="1.0" encoding="utf-8"?>
+<p:sld xmlns:a="http://schemas.openxmlformats.org/drawingml/2006/main" xmlns:r="http://schemas.openxmlformats.org/officeDocument/2006/relationships" xmlns:p="http://schemas.openxmlformats.org/presentationml/2006/main">
+  <p:cSld>
+    <p:spTree>
+      <p:nvGrpSpPr>
+        <p:cNvPr id="1" name=""/>
+        <p:cNvGrpSpPr/>
+        <p:nvPr/>
+      </p:nvGrpSpPr>
+      <p:grpSpPr>
+        <a:xfrm>
+          <a:off x="0" y="0"/>
+          <a:ext cx="0" cy="0"/>
+          <a:chOff x="0" y="0"/>
+          <a:chExt cx="0" cy="0"/>
+        </a:xfrm>
+      </p:grpSpPr>
+      <p:sp>
+        <p:nvSpPr>
+          <p:cNvPr id="4" name="TextBox 3"/>
+          <p:cNvSpPr txBox="1"/>
+          <p:nvPr/>
+        </p:nvSpPr>
+        <p:spPr>
+          <a:xfrm>
+            <a:off x="3147647" y="167055"/>
+            <a:ext cx="6119368" cy="861774"/>
+          </a:xfrm>
+          <a:prstGeom prst="rect">
+            <a:avLst/>
+          </a:prstGeom>
+          <a:noFill/>
+        </p:spPr>
+        <p:txBody>
+          <a:bodyPr wrap="none" rtlCol="0">
+            <a:spAutoFit/>
+          </a:bodyPr>
+          <a:lstStyle/>
+          <a:p>
+            <a:r>
+              <a:rPr lang="en-US" sz="5000" dirty="0" smtClean="0"/>
+              <a:t>Training AOP-AOR-LOG</a:t>
+            </a:r>
+            <a:endParaRPr lang="en-US" sz="5000" dirty="0"/>
+          </a:p>
+        </p:txBody>
+      </p:sp>
+      <p:sp>
+        <p:nvSpPr>
+          <p:cNvPr id="5" name="TextBox 4"/>
+          <p:cNvSpPr txBox="1"/>
+          <p:nvPr/>
+        </p:nvSpPr>
+        <p:spPr>
+          <a:xfrm>
+            <a:off x="1063869" y="1301261"/>
+            <a:ext cx="740908" cy="369332"/>
+          </a:xfrm>
+          <a:prstGeom prst="rect">
+            <a:avLst/>
+          </a:prstGeom>
+          <a:noFill/>
+        </p:spPr>
+        <p:txBody>
+          <a:bodyPr wrap="none" rtlCol="0">
+            <a:spAutoFit/>
+          </a:bodyPr>
+          <a:lstStyle/>
+          <a:p>
+            <a:r>
+              <a:rPr lang="en-US" smtClean="0"/>
+              <a:t>3. Log</a:t>
+            </a:r>
+          </a:p>
+        </p:txBody>
+      </p:sp>
+      <p:sp>
+        <p:nvSpPr>
+          <p:cNvPr id="8" name="TextBox 7"/>
+          <p:cNvSpPr txBox="1"/>
+          <p:nvPr/>
+        </p:nvSpPr>
+        <p:spPr>
+          <a:xfrm>
+            <a:off x="1553143" y="1705707"/>
+            <a:ext cx="1340432" cy="369332"/>
+          </a:xfrm>
+          <a:prstGeom prst="rect">
+            <a:avLst/>
+          </a:prstGeom>
+          <a:noFill/>
+        </p:spPr>
+        <p:txBody>
+          <a:bodyPr wrap="none" rtlCol="0">
+            <a:spAutoFit/>
+          </a:bodyPr>
+          <a:lstStyle/>
+          <a:p>
+            <a:r>
+              <a:rPr lang="en-US" smtClean="0"/>
+              <a:t>3.3 Moduler</a:t>
+            </a:r>
+            <a:endParaRPr lang="en-US" dirty="0" smtClean="0"/>
+          </a:p>
+        </p:txBody>
+      </p:sp>
+      <p:sp>
+        <p:nvSpPr>
+          <p:cNvPr id="17" name="TextBox 16"/>
+          <p:cNvSpPr txBox="1"/>
+          <p:nvPr/>
+        </p:nvSpPr>
+        <p:spPr>
+          <a:xfrm>
+            <a:off x="8806472" y="5622084"/>
+            <a:ext cx="1480213" cy="369332"/>
+          </a:xfrm>
+          <a:prstGeom prst="rect">
+            <a:avLst/>
+          </a:prstGeom>
+          <a:noFill/>
+        </p:spPr>
+        <p:txBody>
+          <a:bodyPr wrap="none" rtlCol="0">
+            <a:spAutoFit/>
+          </a:bodyPr>
+          <a:lstStyle/>
+          <a:p>
+            <a:r>
+              <a:rPr lang="en-US" dirty="0" smtClean="0"/>
+              <a:t>Đoàn Tô Châu</a:t>
+            </a:r>
+            <a:endParaRPr lang="en-US" dirty="0"/>
+          </a:p>
+        </p:txBody>
+      </p:sp>
+      <p:sp>
+        <p:nvSpPr>
+          <p:cNvPr id="19" name="TextBox 18"/>
+          <p:cNvSpPr txBox="1"/>
+          <p:nvPr/>
+        </p:nvSpPr>
+        <p:spPr>
+          <a:xfrm>
+            <a:off x="8806472" y="6079284"/>
+            <a:ext cx="1379480" cy="369332"/>
+          </a:xfrm>
+          <a:prstGeom prst="rect">
+            <a:avLst/>
+          </a:prstGeom>
+          <a:noFill/>
+        </p:spPr>
+        <p:txBody>
+          <a:bodyPr wrap="none" rtlCol="0">
+            <a:spAutoFit/>
+          </a:bodyPr>
+          <a:lstStyle/>
+          <a:p>
+            <a:r>
+              <a:rPr lang="en-US" dirty="0" err="1" smtClean="0"/>
+              <a:t>Trần</a:t>
+            </a:r>
+            <a:r>
+              <a:rPr lang="en-US" dirty="0" smtClean="0"/>
+              <a:t> </a:t>
+            </a:r>
+            <a:r>
+              <a:rPr lang="en-US" dirty="0" err="1" smtClean="0"/>
+              <a:t>Đại</a:t>
+            </a:r>
+            <a:r>
+              <a:rPr lang="en-US" dirty="0" smtClean="0"/>
+              <a:t> </a:t>
+            </a:r>
+            <a:r>
+              <a:rPr lang="en-US" dirty="0" err="1" smtClean="0"/>
+              <a:t>Việt</a:t>
+            </a:r>
+            <a:endParaRPr lang="en-US" dirty="0"/>
+          </a:p>
+        </p:txBody>
+      </p:sp>
+      <p:sp>
+        <p:nvSpPr>
+          <p:cNvPr id="20" name="Slide Number Placeholder 19"/>
+          <p:cNvSpPr>
+            <a:spLocks noGrp="1"/>
+          </p:cNvSpPr>
+          <p:nvPr>
+            <p:ph type="sldNum" sz="quarter" idx="12"/>
+          </p:nvPr>
+        </p:nvSpPr>
+        <p:spPr/>
+        <p:txBody>
+          <a:bodyPr/>
+          <a:lstStyle/>
+          <a:p>
+            <a:fld id="{220ACD78-42D4-4F83-B1EA-CB66A4DB74A6}" type="slidenum">
+              <a:rPr lang="en-US" smtClean="0"/>
+              <a:t>9</a:t>
+            </a:fld>
+            <a:endParaRPr lang="en-US"/>
+          </a:p>
+        </p:txBody>
+      </p:sp>
+      <p:sp>
+        <p:nvSpPr>
+          <p:cNvPr id="18" name="TextBox 17"/>
+          <p:cNvSpPr txBox="1"/>
+          <p:nvPr/>
+        </p:nvSpPr>
+        <p:spPr>
+          <a:xfrm>
+            <a:off x="1984955" y="2248258"/>
+            <a:ext cx="3508140" cy="369332"/>
+          </a:xfrm>
+          <a:prstGeom prst="rect">
+            <a:avLst/>
+          </a:prstGeom>
+          <a:noFill/>
+        </p:spPr>
+        <p:txBody>
+          <a:bodyPr wrap="none" rtlCol="0">
+            <a:spAutoFit/>
+          </a:bodyPr>
+          <a:lstStyle/>
+          <a:p>
+            <a:r>
+              <a:rPr lang="en-US" smtClean="0"/>
+              <a:t>Console, file, email, elasticsearch,…</a:t>
+            </a:r>
+            <a:endParaRPr lang="en-US" dirty="0" smtClean="0"/>
+          </a:p>
+        </p:txBody>
+      </p:sp>
+      <p:sp>
+        <p:nvSpPr>
+          <p:cNvPr id="10" name="Rectangle 9"/>
+          <p:cNvSpPr/>
+          <p:nvPr/>
+        </p:nvSpPr>
+        <p:spPr>
+          <a:xfrm>
+            <a:off x="5420178" y="3221918"/>
+            <a:ext cx="1574305" cy="470671"/>
+          </a:xfrm>
+          <a:prstGeom prst="rect">
+            <a:avLst/>
+          </a:prstGeom>
+          <a:noFill/>
+          <a:ln w="57150">
+            <a:solidFill>
+              <a:srgbClr val="FF0000"/>
+            </a:solidFill>
+          </a:ln>
+        </p:spPr>
+        <p:style>
+          <a:lnRef idx="2">
+            <a:schemeClr val="accent1">
+              <a:shade val="50000"/>
+            </a:schemeClr>
+          </a:lnRef>
+          <a:fillRef idx="1">
+            <a:schemeClr val="accent1"/>
+          </a:fillRef>
+          <a:effectRef idx="0">
+            <a:schemeClr val="accent1"/>
+          </a:effectRef>
+          <a:fontRef idx="minor">
+            <a:schemeClr val="lt1"/>
+          </a:fontRef>
+        </p:style>
+        <p:txBody>
+          <a:bodyPr rtlCol="0" anchor="ctr"/>
+          <a:lstStyle/>
+          <a:p>
+            <a:pPr algn="ctr"/>
+            <a:r>
+              <a:rPr lang="en-US" sz="2000" dirty="0" smtClean="0">
+                <a:solidFill>
+                  <a:srgbClr val="FFFF00"/>
+                </a:solidFill>
+              </a:rPr>
+              <a:t>Demo</a:t>
+            </a:r>
+            <a:endParaRPr lang="en-US" sz="2000" dirty="0">
+              <a:solidFill>
+                <a:srgbClr val="FFFF00"/>
+              </a:solidFill>
+            </a:endParaRPr>
+          </a:p>
+        </p:txBody>
+      </p:sp>
+    </p:spTree>
+    <p:extLst>
+      <p:ext uri="{BB962C8B-B14F-4D97-AF65-F5344CB8AC3E}">
+        <p14:creationId xmlns:p14="http://schemas.microsoft.com/office/powerpoint/2010/main" val="782397955"/>
+      </p:ext>
+    </p:extLst>
+  </p:cSld>
+  <p:clrMapOvr>
+    <a:masterClrMapping/>
+  </p:clrMapOvr>
+  <p:timing>
+    <p:tnLst>
+      <p:par>
+        <p:cTn id="1" dur="indefinite" restart="never" nodeType="tmRoot">
+          <p:childTnLst>
+            <p:seq concurrent="1" nextAc="seek">
+              <p:cTn id="2" dur="indefinite" nodeType="mainSeq">
+                <p:childTnLst>
+                  <p:par>
+                    <p:cTn id="3" fill="hold">
+                      <p:stCondLst>
+                        <p:cond delay="indefinite"/>
+                      </p:stCondLst>
+                      <p:childTnLst>
+                        <p:par>
+                          <p:cTn id="4" fill="hold">
+                            <p:stCondLst>
+                              <p:cond delay="0"/>
+                            </p:stCondLst>
+                            <p:childTnLst>
+                              <p:par>
+                                <p:cTn id="5" presetID="1" presetClass="entr" presetSubtype="0" fill="hold" grpId="0" nodeType="clickEffect">
+                                  <p:stCondLst>
+                                    <p:cond delay="0"/>
+                                  </p:stCondLst>
+                                  <p:childTnLst>
+                                    <p:set>
+                                      <p:cBhvr>
+                                        <p:cTn id="6" dur="1" fill="hold">
+                                          <p:stCondLst>
+                                            <p:cond delay="0"/>
+                                          </p:stCondLst>
+                                        </p:cTn>
+                                        <p:tgtEl>
+                                          <p:spTgt spid="10"/>
+                                        </p:tgtEl>
+                                        <p:attrNameLst>
+                                          <p:attrName>style.visibility</p:attrName>
+                                        </p:attrNameLst>
+                                      </p:cBhvr>
+                                      <p:to>
+                                        <p:strVal val="visible"/>
+                                      </p:to>
+                                    </p:set>
+                                  </p:childTnLst>
+                                </p:cTn>
+                              </p:par>
+                            </p:childTnLst>
+                          </p:cTn>
+                        </p:par>
+                      </p:childTnLst>
+                    </p:cTn>
+                  </p:par>
+                </p:childTnLst>
+              </p:cTn>
+              <p:prevCondLst>
+                <p:cond evt="onPrev" delay="0">
+                  <p:tgtEl>
+                    <p:sldTgt/>
+                  </p:tgtEl>
+                </p:cond>
+              </p:prevCondLst>
+              <p:nextCondLst>
+                <p:cond evt="onNext" delay="0">
+                  <p:tgtEl>
+                    <p:sldTgt/>
+                  </p:tgtEl>
+                </p:cond>
+              </p:nextCondLst>
+            </p:seq>
+          </p:childTnLst>
+        </p:cTn>
+      </p:par>
+    </p:tnLst>
+    <p:bldLst>
+      <p:bldP spid="10" grpId="0" animBg="1"/>
+    </p:bldLst>
   </p:timing>
 </p:sld>
 </file>

</xml_diff>